<commit_message>
Make sure that we save them with different names, we can merge them later.
</commit_message>
<xml_diff>
--- a/Hate_Crime_Study.pptx
+++ b/Hate_Crime_Study.pptx
@@ -6,7 +6,10 @@
   </p:sldMasterIdLst>
   <p:sldIdLst>
     <p:sldId id="256" r:id="rId2"/>
-    <p:sldId id="257" r:id="rId3"/>
+    <p:sldId id="258" r:id="rId3"/>
+    <p:sldId id="259" r:id="rId4"/>
+    <p:sldId id="260" r:id="rId5"/>
+    <p:sldId id="257" r:id="rId6"/>
   </p:sldIdLst>
   <p:sldSz cx="12192000" cy="6858000"/>
   <p:notesSz cx="6858000" cy="9144000"/>
@@ -105,7 +108,373 @@
       </a:defRPr>
     </a:lvl9pPr>
   </p:defaultTextStyle>
+  <p:extLst>
+    <p:ext uri="{EFAFB233-063F-42B5-8137-9DF3F51BA10A}">
+      <p15:sldGuideLst xmlns:p15="http://schemas.microsoft.com/office/powerpoint/2012/main"/>
+    </p:ext>
+  </p:extLst>
 </p:presentation>
+</file>
+
+<file path=ppt/revisionInfo.xml><?xml version="1.0" encoding="utf-8"?>
+<p1510:revInfo xmlns:a="http://schemas.openxmlformats.org/drawingml/2006/main" xmlns:r="http://schemas.openxmlformats.org/officeDocument/2006/relationships" xmlns:p1510="http://schemas.microsoft.com/office/powerpoint/2015/10/main">
+  <p1510:revLst>
+    <p1510:client id="{7E52E15B-118E-48E1-BFC4-0F09364210F9}" v="27" dt="2019-07-11T02:55:23.720"/>
+  </p1510:revLst>
+</p1510:revInfo>
+</file>
+
+<file path=ppt/changesInfos/changesInfo1.xml><?xml version="1.0" encoding="utf-8"?>
+<pc:chgInfo xmlns:a="http://schemas.openxmlformats.org/drawingml/2006/main" xmlns:r="http://schemas.openxmlformats.org/officeDocument/2006/relationships" xmlns:ac="http://schemas.microsoft.com/office/drawing/2013/main/command" xmlns:pc="http://schemas.microsoft.com/office/powerpoint/2013/main/command">
+  <pc:docChgLst>
+    <pc:chgData name="Zachary Grinacoff" userId="f4ab6bb43d9bbc24" providerId="LiveId" clId="{7E52E15B-118E-48E1-BFC4-0F09364210F9}"/>
+    <pc:docChg chg="undo custSel mod addSld delSld modSld sldOrd">
+      <pc:chgData name="Zachary Grinacoff" userId="f4ab6bb43d9bbc24" providerId="LiveId" clId="{7E52E15B-118E-48E1-BFC4-0F09364210F9}" dt="2019-07-11T03:01:08.599" v="1179" actId="20577"/>
+      <pc:docMkLst>
+        <pc:docMk/>
+      </pc:docMkLst>
+      <pc:sldChg chg="modSp del">
+        <pc:chgData name="Zachary Grinacoff" userId="f4ab6bb43d9bbc24" providerId="LiveId" clId="{7E52E15B-118E-48E1-BFC4-0F09364210F9}" dt="2019-07-11T02:04:14.437" v="12" actId="2696"/>
+        <pc:sldMkLst>
+          <pc:docMk/>
+          <pc:sldMk cId="3083179064" sldId="257"/>
+        </pc:sldMkLst>
+        <pc:spChg chg="mod">
+          <ac:chgData name="Zachary Grinacoff" userId="f4ab6bb43d9bbc24" providerId="LiveId" clId="{7E52E15B-118E-48E1-BFC4-0F09364210F9}" dt="2019-07-11T02:01:32.408" v="11" actId="20577"/>
+          <ac:spMkLst>
+            <pc:docMk/>
+            <pc:sldMk cId="3083179064" sldId="257"/>
+            <ac:spMk id="2" creationId="{F48BA308-9B01-4835-BAD5-54D3BC5F7BAF}"/>
+          </ac:spMkLst>
+        </pc:spChg>
+      </pc:sldChg>
+      <pc:sldChg chg="addSp delSp modSp add mod setBg">
+        <pc:chgData name="Zachary Grinacoff" userId="f4ab6bb43d9bbc24" providerId="LiveId" clId="{7E52E15B-118E-48E1-BFC4-0F09364210F9}" dt="2019-07-11T02:50:55.838" v="886" actId="20577"/>
+        <pc:sldMkLst>
+          <pc:docMk/>
+          <pc:sldMk cId="3593529453" sldId="257"/>
+        </pc:sldMkLst>
+        <pc:spChg chg="mod">
+          <ac:chgData name="Zachary Grinacoff" userId="f4ab6bb43d9bbc24" providerId="LiveId" clId="{7E52E15B-118E-48E1-BFC4-0F09364210F9}" dt="2019-07-11T02:40:21.142" v="851" actId="26606"/>
+          <ac:spMkLst>
+            <pc:docMk/>
+            <pc:sldMk cId="3593529453" sldId="257"/>
+            <ac:spMk id="2" creationId="{28750D29-79F8-4FE9-BE40-B7BAE2B1F7B9}"/>
+          </ac:spMkLst>
+        </pc:spChg>
+        <pc:spChg chg="mod">
+          <ac:chgData name="Zachary Grinacoff" userId="f4ab6bb43d9bbc24" providerId="LiveId" clId="{7E52E15B-118E-48E1-BFC4-0F09364210F9}" dt="2019-07-11T02:50:55.838" v="886" actId="20577"/>
+          <ac:spMkLst>
+            <pc:docMk/>
+            <pc:sldMk cId="3593529453" sldId="257"/>
+            <ac:spMk id="3" creationId="{FC6A2D2E-209A-47B0-A00D-E3A7C76B1FF6}"/>
+          </ac:spMkLst>
+        </pc:spChg>
+        <pc:spChg chg="add del">
+          <ac:chgData name="Zachary Grinacoff" userId="f4ab6bb43d9bbc24" providerId="LiveId" clId="{7E52E15B-118E-48E1-BFC4-0F09364210F9}" dt="2019-07-11T02:40:13.925" v="846" actId="26606"/>
+          <ac:spMkLst>
+            <pc:docMk/>
+            <pc:sldMk cId="3593529453" sldId="257"/>
+            <ac:spMk id="8" creationId="{559AE206-7EBA-4D33-8BC9-9D8158553F0E}"/>
+          </ac:spMkLst>
+        </pc:spChg>
+        <pc:spChg chg="add del">
+          <ac:chgData name="Zachary Grinacoff" userId="f4ab6bb43d9bbc24" providerId="LiveId" clId="{7E52E15B-118E-48E1-BFC4-0F09364210F9}" dt="2019-07-11T02:40:13.925" v="846" actId="26606"/>
+          <ac:spMkLst>
+            <pc:docMk/>
+            <pc:sldMk cId="3593529453" sldId="257"/>
+            <ac:spMk id="10" creationId="{6437D937-A7F1-4011-92B4-328E5BE1B166}"/>
+          </ac:spMkLst>
+        </pc:spChg>
+        <pc:spChg chg="add del">
+          <ac:chgData name="Zachary Grinacoff" userId="f4ab6bb43d9bbc24" providerId="LiveId" clId="{7E52E15B-118E-48E1-BFC4-0F09364210F9}" dt="2019-07-11T02:40:13.925" v="846" actId="26606"/>
+          <ac:spMkLst>
+            <pc:docMk/>
+            <pc:sldMk cId="3593529453" sldId="257"/>
+            <ac:spMk id="12" creationId="{B672F332-AF08-46C6-94F0-77684310D7B7}"/>
+          </ac:spMkLst>
+        </pc:spChg>
+        <pc:spChg chg="add del">
+          <ac:chgData name="Zachary Grinacoff" userId="f4ab6bb43d9bbc24" providerId="LiveId" clId="{7E52E15B-118E-48E1-BFC4-0F09364210F9}" dt="2019-07-11T02:40:13.925" v="846" actId="26606"/>
+          <ac:spMkLst>
+            <pc:docMk/>
+            <pc:sldMk cId="3593529453" sldId="257"/>
+            <ac:spMk id="14" creationId="{34244EF8-D73A-40E1-BE73-D46E6B4B04ED}"/>
+          </ac:spMkLst>
+        </pc:spChg>
+        <pc:spChg chg="add del">
+          <ac:chgData name="Zachary Grinacoff" userId="f4ab6bb43d9bbc24" providerId="LiveId" clId="{7E52E15B-118E-48E1-BFC4-0F09364210F9}" dt="2019-07-11T02:40:13.925" v="846" actId="26606"/>
+          <ac:spMkLst>
+            <pc:docMk/>
+            <pc:sldMk cId="3593529453" sldId="257"/>
+            <ac:spMk id="16" creationId="{AB84D7E8-4ECB-42D7-ADBF-01689B0F24AE}"/>
+          </ac:spMkLst>
+        </pc:spChg>
+        <pc:spChg chg="add del">
+          <ac:chgData name="Zachary Grinacoff" userId="f4ab6bb43d9bbc24" providerId="LiveId" clId="{7E52E15B-118E-48E1-BFC4-0F09364210F9}" dt="2019-07-11T02:40:17.054" v="848" actId="26606"/>
+          <ac:spMkLst>
+            <pc:docMk/>
+            <pc:sldMk cId="3593529453" sldId="257"/>
+            <ac:spMk id="20" creationId="{6F9EB9F2-07E2-4D64-BBD8-BB5B217F1218}"/>
+          </ac:spMkLst>
+        </pc:spChg>
+        <pc:spChg chg="add del">
+          <ac:chgData name="Zachary Grinacoff" userId="f4ab6bb43d9bbc24" providerId="LiveId" clId="{7E52E15B-118E-48E1-BFC4-0F09364210F9}" dt="2019-07-11T02:40:21.124" v="850" actId="26606"/>
+          <ac:spMkLst>
+            <pc:docMk/>
+            <pc:sldMk cId="3593529453" sldId="257"/>
+            <ac:spMk id="23" creationId="{559AE206-7EBA-4D33-8BC9-9D8158553F0E}"/>
+          </ac:spMkLst>
+        </pc:spChg>
+        <pc:spChg chg="add del">
+          <ac:chgData name="Zachary Grinacoff" userId="f4ab6bb43d9bbc24" providerId="LiveId" clId="{7E52E15B-118E-48E1-BFC4-0F09364210F9}" dt="2019-07-11T02:40:21.124" v="850" actId="26606"/>
+          <ac:spMkLst>
+            <pc:docMk/>
+            <pc:sldMk cId="3593529453" sldId="257"/>
+            <ac:spMk id="24" creationId="{6437D937-A7F1-4011-92B4-328E5BE1B166}"/>
+          </ac:spMkLst>
+        </pc:spChg>
+        <pc:spChg chg="add del">
+          <ac:chgData name="Zachary Grinacoff" userId="f4ab6bb43d9bbc24" providerId="LiveId" clId="{7E52E15B-118E-48E1-BFC4-0F09364210F9}" dt="2019-07-11T02:40:21.124" v="850" actId="26606"/>
+          <ac:spMkLst>
+            <pc:docMk/>
+            <pc:sldMk cId="3593529453" sldId="257"/>
+            <ac:spMk id="25" creationId="{B672F332-AF08-46C6-94F0-77684310D7B7}"/>
+          </ac:spMkLst>
+        </pc:spChg>
+        <pc:spChg chg="add del">
+          <ac:chgData name="Zachary Grinacoff" userId="f4ab6bb43d9bbc24" providerId="LiveId" clId="{7E52E15B-118E-48E1-BFC4-0F09364210F9}" dt="2019-07-11T02:40:21.124" v="850" actId="26606"/>
+          <ac:spMkLst>
+            <pc:docMk/>
+            <pc:sldMk cId="3593529453" sldId="257"/>
+            <ac:spMk id="26" creationId="{34244EF8-D73A-40E1-BE73-D46E6B4B04ED}"/>
+          </ac:spMkLst>
+        </pc:spChg>
+        <pc:spChg chg="add del">
+          <ac:chgData name="Zachary Grinacoff" userId="f4ab6bb43d9bbc24" providerId="LiveId" clId="{7E52E15B-118E-48E1-BFC4-0F09364210F9}" dt="2019-07-11T02:40:21.124" v="850" actId="26606"/>
+          <ac:spMkLst>
+            <pc:docMk/>
+            <pc:sldMk cId="3593529453" sldId="257"/>
+            <ac:spMk id="27" creationId="{AB84D7E8-4ECB-42D7-ADBF-01689B0F24AE}"/>
+          </ac:spMkLst>
+        </pc:spChg>
+        <pc:spChg chg="add">
+          <ac:chgData name="Zachary Grinacoff" userId="f4ab6bb43d9bbc24" providerId="LiveId" clId="{7E52E15B-118E-48E1-BFC4-0F09364210F9}" dt="2019-07-11T02:40:21.142" v="851" actId="26606"/>
+          <ac:spMkLst>
+            <pc:docMk/>
+            <pc:sldMk cId="3593529453" sldId="257"/>
+            <ac:spMk id="30" creationId="{D8386171-E87D-46AB-8718-4CE2A88748BD}"/>
+          </ac:spMkLst>
+        </pc:spChg>
+        <pc:spChg chg="add">
+          <ac:chgData name="Zachary Grinacoff" userId="f4ab6bb43d9bbc24" providerId="LiveId" clId="{7E52E15B-118E-48E1-BFC4-0F09364210F9}" dt="2019-07-11T02:40:21.142" v="851" actId="26606"/>
+          <ac:spMkLst>
+            <pc:docMk/>
+            <pc:sldMk cId="3593529453" sldId="257"/>
+            <ac:spMk id="31" creationId="{207CB456-8849-413C-8210-B663779A32E0}"/>
+          </ac:spMkLst>
+        </pc:spChg>
+        <pc:spChg chg="add">
+          <ac:chgData name="Zachary Grinacoff" userId="f4ab6bb43d9bbc24" providerId="LiveId" clId="{7E52E15B-118E-48E1-BFC4-0F09364210F9}" dt="2019-07-11T02:40:21.142" v="851" actId="26606"/>
+          <ac:spMkLst>
+            <pc:docMk/>
+            <pc:sldMk cId="3593529453" sldId="257"/>
+            <ac:spMk id="32" creationId="{E513936D-D1EB-4E42-A97F-942BA1F3DFA7}"/>
+          </ac:spMkLst>
+        </pc:spChg>
+        <pc:cxnChg chg="add del">
+          <ac:chgData name="Zachary Grinacoff" userId="f4ab6bb43d9bbc24" providerId="LiveId" clId="{7E52E15B-118E-48E1-BFC4-0F09364210F9}" dt="2019-07-11T02:40:13.925" v="846" actId="26606"/>
+          <ac:cxnSpMkLst>
+            <pc:docMk/>
+            <pc:sldMk cId="3593529453" sldId="257"/>
+            <ac:cxnSpMk id="18" creationId="{9E8E38ED-369A-44C2-B635-0BED0E48A6E8}"/>
+          </ac:cxnSpMkLst>
+        </pc:cxnChg>
+        <pc:cxnChg chg="add del">
+          <ac:chgData name="Zachary Grinacoff" userId="f4ab6bb43d9bbc24" providerId="LiveId" clId="{7E52E15B-118E-48E1-BFC4-0F09364210F9}" dt="2019-07-11T02:40:17.054" v="848" actId="26606"/>
+          <ac:cxnSpMkLst>
+            <pc:docMk/>
+            <pc:sldMk cId="3593529453" sldId="257"/>
+            <ac:cxnSpMk id="21" creationId="{F0C57C7C-DFE9-4A1E-B7A9-DF40E63366BB}"/>
+          </ac:cxnSpMkLst>
+        </pc:cxnChg>
+        <pc:cxnChg chg="add del">
+          <ac:chgData name="Zachary Grinacoff" userId="f4ab6bb43d9bbc24" providerId="LiveId" clId="{7E52E15B-118E-48E1-BFC4-0F09364210F9}" dt="2019-07-11T02:40:21.124" v="850" actId="26606"/>
+          <ac:cxnSpMkLst>
+            <pc:docMk/>
+            <pc:sldMk cId="3593529453" sldId="257"/>
+            <ac:cxnSpMk id="28" creationId="{9E8E38ED-369A-44C2-B635-0BED0E48A6E8}"/>
+          </ac:cxnSpMkLst>
+        </pc:cxnChg>
+      </pc:sldChg>
+      <pc:sldChg chg="addSp delSp modSp add mod ord setBg setClrOvrMap">
+        <pc:chgData name="Zachary Grinacoff" userId="f4ab6bb43d9bbc24" providerId="LiveId" clId="{7E52E15B-118E-48E1-BFC4-0F09364210F9}" dt="2019-07-11T02:54:55.521" v="924" actId="20577"/>
+        <pc:sldMkLst>
+          <pc:docMk/>
+          <pc:sldMk cId="596094324" sldId="258"/>
+        </pc:sldMkLst>
+        <pc:spChg chg="mod">
+          <ac:chgData name="Zachary Grinacoff" userId="f4ab6bb43d9bbc24" providerId="LiveId" clId="{7E52E15B-118E-48E1-BFC4-0F09364210F9}" dt="2019-07-11T02:39:46.452" v="842" actId="26606"/>
+          <ac:spMkLst>
+            <pc:docMk/>
+            <pc:sldMk cId="596094324" sldId="258"/>
+            <ac:spMk id="2" creationId="{40B566B0-D4D3-4B15-A408-C46CFFBAD423}"/>
+          </ac:spMkLst>
+        </pc:spChg>
+        <pc:spChg chg="add del mod">
+          <ac:chgData name="Zachary Grinacoff" userId="f4ab6bb43d9bbc24" providerId="LiveId" clId="{7E52E15B-118E-48E1-BFC4-0F09364210F9}" dt="2019-07-11T02:39:46.452" v="842" actId="26606"/>
+          <ac:spMkLst>
+            <pc:docMk/>
+            <pc:sldMk cId="596094324" sldId="258"/>
+            <ac:spMk id="3" creationId="{CB8BE323-E2B3-4295-A457-68CEB53E5B61}"/>
+          </ac:spMkLst>
+        </pc:spChg>
+        <pc:spChg chg="add del">
+          <ac:chgData name="Zachary Grinacoff" userId="f4ab6bb43d9bbc24" providerId="LiveId" clId="{7E52E15B-118E-48E1-BFC4-0F09364210F9}" dt="2019-07-11T02:39:46.440" v="841" actId="26606"/>
+          <ac:spMkLst>
+            <pc:docMk/>
+            <pc:sldMk cId="596094324" sldId="258"/>
+            <ac:spMk id="8" creationId="{48A740BC-A0AA-45E0-B899-2AE9C6FE11CA}"/>
+          </ac:spMkLst>
+        </pc:spChg>
+        <pc:spChg chg="add del">
+          <ac:chgData name="Zachary Grinacoff" userId="f4ab6bb43d9bbc24" providerId="LiveId" clId="{7E52E15B-118E-48E1-BFC4-0F09364210F9}" dt="2019-07-11T02:39:43.978" v="839" actId="26606"/>
+          <ac:spMkLst>
+            <pc:docMk/>
+            <pc:sldMk cId="596094324" sldId="258"/>
+            <ac:spMk id="10" creationId="{42285737-90EE-47DC-AC80-8AE156B11969}"/>
+          </ac:spMkLst>
+        </pc:spChg>
+        <pc:spChg chg="add del">
+          <ac:chgData name="Zachary Grinacoff" userId="f4ab6bb43d9bbc24" providerId="LiveId" clId="{7E52E15B-118E-48E1-BFC4-0F09364210F9}" dt="2019-07-11T02:39:46.440" v="841" actId="26606"/>
+          <ac:spMkLst>
+            <pc:docMk/>
+            <pc:sldMk cId="596094324" sldId="258"/>
+            <ac:spMk id="21" creationId="{CB8BE323-E2B3-4295-A457-68CEB53E5B61}"/>
+          </ac:spMkLst>
+        </pc:spChg>
+        <pc:spChg chg="add">
+          <ac:chgData name="Zachary Grinacoff" userId="f4ab6bb43d9bbc24" providerId="LiveId" clId="{7E52E15B-118E-48E1-BFC4-0F09364210F9}" dt="2019-07-11T02:39:46.452" v="842" actId="26606"/>
+          <ac:spMkLst>
+            <pc:docMk/>
+            <pc:sldMk cId="596094324" sldId="258"/>
+            <ac:spMk id="23" creationId="{F98ED85F-DCEE-4B50-802E-71A6E3E12B04}"/>
+          </ac:spMkLst>
+        </pc:spChg>
+        <pc:spChg chg="add mod">
+          <ac:chgData name="Zachary Grinacoff" userId="f4ab6bb43d9bbc24" providerId="LiveId" clId="{7E52E15B-118E-48E1-BFC4-0F09364210F9}" dt="2019-07-11T02:54:55.521" v="924" actId="20577"/>
+          <ac:spMkLst>
+            <pc:docMk/>
+            <pc:sldMk cId="596094324" sldId="258"/>
+            <ac:spMk id="24" creationId="{CB8BE323-E2B3-4295-A457-68CEB53E5B61}"/>
+          </ac:spMkLst>
+        </pc:spChg>
+        <pc:grpChg chg="add del">
+          <ac:chgData name="Zachary Grinacoff" userId="f4ab6bb43d9bbc24" providerId="LiveId" clId="{7E52E15B-118E-48E1-BFC4-0F09364210F9}" dt="2019-07-11T02:39:43.978" v="839" actId="26606"/>
+          <ac:grpSpMkLst>
+            <pc:docMk/>
+            <pc:sldMk cId="596094324" sldId="258"/>
+            <ac:grpSpMk id="12" creationId="{B57BDC17-F1B3-455F-BBF1-680AA1F25C06}"/>
+          </ac:grpSpMkLst>
+        </pc:grpChg>
+        <pc:graphicFrameChg chg="add del">
+          <ac:chgData name="Zachary Grinacoff" userId="f4ab6bb43d9bbc24" providerId="LiveId" clId="{7E52E15B-118E-48E1-BFC4-0F09364210F9}" dt="2019-07-11T02:39:43.978" v="839" actId="26606"/>
+          <ac:graphicFrameMkLst>
+            <pc:docMk/>
+            <pc:sldMk cId="596094324" sldId="258"/>
+            <ac:graphicFrameMk id="5" creationId="{238B9D90-DB6D-4718-8D94-7C06D996E9B1}"/>
+          </ac:graphicFrameMkLst>
+        </pc:graphicFrameChg>
+        <pc:cxnChg chg="add del">
+          <ac:chgData name="Zachary Grinacoff" userId="f4ab6bb43d9bbc24" providerId="LiveId" clId="{7E52E15B-118E-48E1-BFC4-0F09364210F9}" dt="2019-07-11T02:39:46.440" v="841" actId="26606"/>
+          <ac:cxnSpMkLst>
+            <pc:docMk/>
+            <pc:sldMk cId="596094324" sldId="258"/>
+            <ac:cxnSpMk id="20" creationId="{B874EF51-C858-4BB9-97C3-D17755787127}"/>
+          </ac:cxnSpMkLst>
+        </pc:cxnChg>
+      </pc:sldChg>
+      <pc:sldChg chg="addSp modSp add mod setBg">
+        <pc:chgData name="Zachary Grinacoff" userId="f4ab6bb43d9bbc24" providerId="LiveId" clId="{7E52E15B-118E-48E1-BFC4-0F09364210F9}" dt="2019-07-11T03:01:08.599" v="1179" actId="20577"/>
+        <pc:sldMkLst>
+          <pc:docMk/>
+          <pc:sldMk cId="2305445753" sldId="259"/>
+        </pc:sldMkLst>
+        <pc:spChg chg="mod">
+          <ac:chgData name="Zachary Grinacoff" userId="f4ab6bb43d9bbc24" providerId="LiveId" clId="{7E52E15B-118E-48E1-BFC4-0F09364210F9}" dt="2019-07-11T02:39:55.107" v="843" actId="26606"/>
+          <ac:spMkLst>
+            <pc:docMk/>
+            <pc:sldMk cId="2305445753" sldId="259"/>
+            <ac:spMk id="2" creationId="{FD941AC5-D366-4F3A-90F1-BEF2CC19D74C}"/>
+          </ac:spMkLst>
+        </pc:spChg>
+        <pc:spChg chg="mod">
+          <ac:chgData name="Zachary Grinacoff" userId="f4ab6bb43d9bbc24" providerId="LiveId" clId="{7E52E15B-118E-48E1-BFC4-0F09364210F9}" dt="2019-07-11T03:01:08.599" v="1179" actId="20577"/>
+          <ac:spMkLst>
+            <pc:docMk/>
+            <pc:sldMk cId="2305445753" sldId="259"/>
+            <ac:spMk id="3" creationId="{5D0E4B2D-E204-4850-A9BF-F49B44C74727}"/>
+          </ac:spMkLst>
+        </pc:spChg>
+        <pc:spChg chg="add">
+          <ac:chgData name="Zachary Grinacoff" userId="f4ab6bb43d9bbc24" providerId="LiveId" clId="{7E52E15B-118E-48E1-BFC4-0F09364210F9}" dt="2019-07-11T02:39:55.107" v="843" actId="26606"/>
+          <ac:spMkLst>
+            <pc:docMk/>
+            <pc:sldMk cId="2305445753" sldId="259"/>
+            <ac:spMk id="8" creationId="{F98ED85F-DCEE-4B50-802E-71A6E3E12B04}"/>
+          </ac:spMkLst>
+        </pc:spChg>
+      </pc:sldChg>
+      <pc:sldChg chg="addSp delSp modSp add mod ord setBg">
+        <pc:chgData name="Zachary Grinacoff" userId="f4ab6bb43d9bbc24" providerId="LiveId" clId="{7E52E15B-118E-48E1-BFC4-0F09364210F9}" dt="2019-07-11T02:44:06.091" v="873" actId="20577"/>
+        <pc:sldMkLst>
+          <pc:docMk/>
+          <pc:sldMk cId="3966133736" sldId="260"/>
+        </pc:sldMkLst>
+        <pc:spChg chg="del">
+          <ac:chgData name="Zachary Grinacoff" userId="f4ab6bb43d9bbc24" providerId="LiveId" clId="{7E52E15B-118E-48E1-BFC4-0F09364210F9}" dt="2019-07-11T02:39:10.465" v="837"/>
+          <ac:spMkLst>
+            <pc:docMk/>
+            <pc:sldMk cId="3966133736" sldId="260"/>
+            <ac:spMk id="2" creationId="{A0EFC806-A5D2-4110-BC8F-A18D4157F4DA}"/>
+          </ac:spMkLst>
+        </pc:spChg>
+        <pc:spChg chg="del">
+          <ac:chgData name="Zachary Grinacoff" userId="f4ab6bb43d9bbc24" providerId="LiveId" clId="{7E52E15B-118E-48E1-BFC4-0F09364210F9}" dt="2019-07-11T02:39:10.465" v="837"/>
+          <ac:spMkLst>
+            <pc:docMk/>
+            <pc:sldMk cId="3966133736" sldId="260"/>
+            <ac:spMk id="3" creationId="{26501168-3A05-4D35-B3B8-232FACD6E972}"/>
+          </ac:spMkLst>
+        </pc:spChg>
+        <pc:spChg chg="add mod">
+          <ac:chgData name="Zachary Grinacoff" userId="f4ab6bb43d9bbc24" providerId="LiveId" clId="{7E52E15B-118E-48E1-BFC4-0F09364210F9}" dt="2019-07-11T02:44:06.091" v="873" actId="20577"/>
+          <ac:spMkLst>
+            <pc:docMk/>
+            <pc:sldMk cId="3966133736" sldId="260"/>
+            <ac:spMk id="4" creationId="{8E25E34F-668C-4540-8F90-C2B5B5CC65D5}"/>
+          </ac:spMkLst>
+        </pc:spChg>
+        <pc:spChg chg="add mod">
+          <ac:chgData name="Zachary Grinacoff" userId="f4ab6bb43d9bbc24" providerId="LiveId" clId="{7E52E15B-118E-48E1-BFC4-0F09364210F9}" dt="2019-07-11T02:39:58.025" v="844" actId="26606"/>
+          <ac:spMkLst>
+            <pc:docMk/>
+            <pc:sldMk cId="3966133736" sldId="260"/>
+            <ac:spMk id="5" creationId="{FD830E9C-8A59-4ECC-B2C0-C421E52B768B}"/>
+          </ac:spMkLst>
+        </pc:spChg>
+        <pc:spChg chg="add">
+          <ac:chgData name="Zachary Grinacoff" userId="f4ab6bb43d9bbc24" providerId="LiveId" clId="{7E52E15B-118E-48E1-BFC4-0F09364210F9}" dt="2019-07-11T02:39:58.025" v="844" actId="26606"/>
+          <ac:spMkLst>
+            <pc:docMk/>
+            <pc:sldMk cId="3966133736" sldId="260"/>
+            <ac:spMk id="10" creationId="{F98ED85F-DCEE-4B50-802E-71A6E3E12B04}"/>
+          </ac:spMkLst>
+        </pc:spChg>
+      </pc:sldChg>
+    </pc:docChg>
+  </pc:docChgLst>
+</pc:chgInfo>
 </file>
 
 <file path=ppt/slideLayouts/slideLayout1.xml><?xml version="1.0" encoding="utf-8"?>
@@ -3649,6 +4018,14 @@
 <file path=ppt/slides/slide2.xml><?xml version="1.0" encoding="utf-8"?>
 <p:sld xmlns:a="http://schemas.openxmlformats.org/drawingml/2006/main" xmlns:r="http://schemas.openxmlformats.org/officeDocument/2006/relationships" xmlns:p="http://schemas.openxmlformats.org/presentationml/2006/main">
   <p:cSld>
+    <p:bg>
+      <p:bgPr>
+        <a:solidFill>
+          <a:schemeClr val="bg1"/>
+        </a:solidFill>
+        <a:effectLst/>
+      </p:bgPr>
+    </p:bg>
     <p:spTree>
       <p:nvGrpSpPr>
         <p:cNvPr id="1" name=""/>
@@ -3665,10 +4042,81 @@
       </p:grpSpPr>
       <p:sp>
         <p:nvSpPr>
+          <p:cNvPr id="23" name="Rectangle 7">
+            <a:extLst>
+              <a:ext uri="{FF2B5EF4-FFF2-40B4-BE49-F238E27FC236}">
+                <a16:creationId xmlns:a16="http://schemas.microsoft.com/office/drawing/2014/main" id="{F98ED85F-DCEE-4B50-802E-71A6E3E12B04}"/>
+              </a:ext>
+              <a:ext uri="{C183D7F6-B498-43B3-948B-1728B52AA6E4}">
+                <adec:decorative xmlns:adec="http://schemas.microsoft.com/office/drawing/2017/decorative" val="1"/>
+              </a:ext>
+            </a:extLst>
+          </p:cNvPr>
+          <p:cNvSpPr>
+            <a:spLocks noGrp="1" noRot="1" noChangeAspect="1" noMove="1" noResize="1" noEditPoints="1" noAdjustHandles="1" noChangeArrowheads="1" noChangeShapeType="1" noTextEdit="1"/>
+          </p:cNvSpPr>
+          <p:nvPr>
+            <p:extLst>
+              <p:ext uri="{386F3935-93C4-4BCD-93E2-E3B085C9AB24}">
+                <p16:designElem xmlns:p16="http://schemas.microsoft.com/office/powerpoint/2015/main" val="1"/>
+              </p:ext>
+            </p:extLst>
+          </p:nvPr>
+        </p:nvSpPr>
+        <p:spPr bwMode="ltGray">
+          <a:xfrm>
+            <a:off x="321564" y="320040"/>
+            <a:ext cx="11548872" cy="6217920"/>
+          </a:xfrm>
+          <a:prstGeom prst="rect">
+            <a:avLst/>
+          </a:prstGeom>
+          <a:solidFill>
+            <a:schemeClr val="tx1">
+              <a:alpha val="14000"/>
+            </a:schemeClr>
+          </a:solidFill>
+          <a:ln w="127000" cap="sq" cmpd="thinThick">
+            <a:solidFill>
+              <a:schemeClr val="tx1">
+                <a:lumMod val="85000"/>
+                <a:lumOff val="15000"/>
+                <a:alpha val="15000"/>
+              </a:schemeClr>
+            </a:solidFill>
+          </a:ln>
+        </p:spPr>
+        <p:style>
+          <a:lnRef idx="2">
+            <a:schemeClr val="accent1">
+              <a:shade val="50000"/>
+            </a:schemeClr>
+          </a:lnRef>
+          <a:fillRef idx="1">
+            <a:schemeClr val="accent1"/>
+          </a:fillRef>
+          <a:effectRef idx="0">
+            <a:schemeClr val="accent1"/>
+          </a:effectRef>
+          <a:fontRef idx="minor">
+            <a:schemeClr val="lt1"/>
+          </a:fontRef>
+        </p:style>
+        <p:txBody>
+          <a:bodyPr rtlCol="0" anchor="ctr"/>
+          <a:lstStyle/>
+          <a:p>
+            <a:pPr algn="ctr"/>
+            <a:endParaRPr lang="en-US"/>
+          </a:p>
+        </p:txBody>
+      </p:sp>
+      <p:sp>
+        <p:nvSpPr>
           <p:cNvPr id="2" name="Title 1">
             <a:extLst>
               <a:ext uri="{FF2B5EF4-FFF2-40B4-BE49-F238E27FC236}">
-                <a16:creationId xmlns:a16="http://schemas.microsoft.com/office/drawing/2014/main" id="{F48BA308-9B01-4835-BAD5-54D3BC5F7BAF}"/>
+                <a16:creationId xmlns:a16="http://schemas.microsoft.com/office/drawing/2014/main" id="{40B566B0-D4D3-4B15-A408-C46CFFBAD423}"/>
               </a:ext>
             </a:extLst>
           </p:cNvPr>
@@ -3679,47 +4127,844 @@
             <p:ph type="title"/>
           </p:nvPr>
         </p:nvSpPr>
-        <p:spPr/>
-        <p:txBody>
-          <a:bodyPr/>
-          <a:lstStyle/>
-          <a:p>
-            <a:r>
-              <a:rPr lang="en-US" dirty="0"/>
-              <a:t>Socioeconomic</a:t>
-            </a:r>
-          </a:p>
-        </p:txBody>
-      </p:sp>
-      <p:sp>
-        <p:nvSpPr>
-          <p:cNvPr id="3" name="Text Placeholder 2">
-            <a:extLst>
-              <a:ext uri="{FF2B5EF4-FFF2-40B4-BE49-F238E27FC236}">
-                <a16:creationId xmlns:a16="http://schemas.microsoft.com/office/drawing/2014/main" id="{C355857E-9F3C-42D5-B037-493253FF81E3}"/>
-              </a:ext>
-            </a:extLst>
-          </p:cNvPr>
-          <p:cNvSpPr>
-            <a:spLocks noGrp="1"/>
-          </p:cNvSpPr>
-          <p:nvPr>
-            <p:ph type="body" idx="1"/>
-          </p:nvPr>
-        </p:nvSpPr>
-        <p:spPr/>
-        <p:txBody>
-          <a:bodyPr/>
-          <a:lstStyle/>
-          <a:p>
-            <a:endParaRPr lang="en-US"/>
+        <p:spPr>
+          <a:xfrm>
+            <a:off x="838200" y="631825"/>
+            <a:ext cx="10515600" cy="1325563"/>
+          </a:xfrm>
+        </p:spPr>
+        <p:txBody>
+          <a:bodyPr>
+            <a:normAutofit/>
+          </a:bodyPr>
+          <a:lstStyle/>
+          <a:p>
+            <a:r>
+              <a:rPr lang="en-US"/>
+              <a:t>Hate Crime Datasets:</a:t>
+            </a:r>
+            <a:endParaRPr lang="en-US" dirty="0"/>
+          </a:p>
+        </p:txBody>
+      </p:sp>
+      <p:sp>
+        <p:nvSpPr>
+          <p:cNvPr id="24" name="Content Placeholder 2">
+            <a:extLst>
+              <a:ext uri="{FF2B5EF4-FFF2-40B4-BE49-F238E27FC236}">
+                <a16:creationId xmlns:a16="http://schemas.microsoft.com/office/drawing/2014/main" id="{CB8BE323-E2B3-4295-A457-68CEB53E5B61}"/>
+              </a:ext>
+            </a:extLst>
+          </p:cNvPr>
+          <p:cNvSpPr>
+            <a:spLocks noGrp="1"/>
+          </p:cNvSpPr>
+          <p:nvPr>
+            <p:ph idx="1"/>
+          </p:nvPr>
+        </p:nvSpPr>
+        <p:spPr>
+          <a:xfrm>
+            <a:off x="838200" y="2057400"/>
+            <a:ext cx="10515600" cy="3871762"/>
+          </a:xfrm>
+        </p:spPr>
+        <p:txBody>
+          <a:bodyPr>
+            <a:normAutofit/>
+          </a:bodyPr>
+          <a:lstStyle/>
+          <a:p>
+            <a:r>
+              <a:rPr lang="en-US" sz="1700" dirty="0"/>
+              <a:t>FBI Crime Data Explorer: Hate Crime Specific</a:t>
+            </a:r>
+          </a:p>
+          <a:p>
+            <a:pPr lvl="1"/>
+            <a:r>
+              <a:rPr lang="en-US" sz="1700" dirty="0">
+                <a:hlinkClick r:id="rId2"/>
+              </a:rPr>
+              <a:t>https://crime-data-explorer.fr.cloud.gov/downloads-and-docs</a:t>
+            </a:r>
+            <a:endParaRPr lang="en-US" sz="1700" dirty="0"/>
+          </a:p>
+          <a:p>
+            <a:pPr lvl="2"/>
+            <a:r>
+              <a:rPr lang="en-US" sz="1700" dirty="0"/>
+              <a:t>Limitations: </a:t>
+            </a:r>
+          </a:p>
+          <a:p>
+            <a:pPr lvl="3"/>
+            <a:r>
+              <a:rPr lang="en-US" sz="1700" dirty="0"/>
+              <a:t>All law enforcement agencies, whether they submit Summary Reporting System (SRS) or National Incident-Based Reporting System (NIBRS) reports, can contribute hate crime data to the UCR Program using forms specified to collect such information. However, not all hate crime related incidents are reported to the proper authorities, thus not collected in the UCR Program dataset.</a:t>
+            </a:r>
+          </a:p>
+          <a:p>
+            <a:endParaRPr lang="en-US" sz="1700" dirty="0"/>
+          </a:p>
+          <a:p>
+            <a:r>
+              <a:rPr lang="en-US" sz="1700" dirty="0"/>
+              <a:t>US Census API Wrapper:</a:t>
+            </a:r>
+          </a:p>
+          <a:p>
+            <a:pPr lvl="1"/>
+            <a:r>
+              <a:rPr lang="en-US" sz="1700" dirty="0">
+                <a:hlinkClick r:id="rId3"/>
+              </a:rPr>
+              <a:t>https://github.com/datamade/census</a:t>
+            </a:r>
+            <a:endParaRPr lang="en-US" sz="1700" dirty="0"/>
           </a:p>
         </p:txBody>
       </p:sp>
     </p:spTree>
     <p:extLst>
       <p:ext uri="{BB962C8B-B14F-4D97-AF65-F5344CB8AC3E}">
-        <p14:creationId xmlns:p14="http://schemas.microsoft.com/office/powerpoint/2010/main" val="3083179064"/>
+        <p14:creationId xmlns:p14="http://schemas.microsoft.com/office/powerpoint/2010/main" val="596094324"/>
+      </p:ext>
+    </p:extLst>
+  </p:cSld>
+  <p:clrMapOvr>
+    <a:masterClrMapping/>
+  </p:clrMapOvr>
+</p:sld>
+</file>
+
+<file path=ppt/slides/slide3.xml><?xml version="1.0" encoding="utf-8"?>
+<p:sld xmlns:a="http://schemas.openxmlformats.org/drawingml/2006/main" xmlns:r="http://schemas.openxmlformats.org/officeDocument/2006/relationships" xmlns:p="http://schemas.openxmlformats.org/presentationml/2006/main">
+  <p:cSld>
+    <p:bg>
+      <p:bgPr>
+        <a:solidFill>
+          <a:schemeClr val="bg1"/>
+        </a:solidFill>
+        <a:effectLst/>
+      </p:bgPr>
+    </p:bg>
+    <p:spTree>
+      <p:nvGrpSpPr>
+        <p:cNvPr id="1" name=""/>
+        <p:cNvGrpSpPr/>
+        <p:nvPr/>
+      </p:nvGrpSpPr>
+      <p:grpSpPr>
+        <a:xfrm>
+          <a:off x="0" y="0"/>
+          <a:ext cx="0" cy="0"/>
+          <a:chOff x="0" y="0"/>
+          <a:chExt cx="0" cy="0"/>
+        </a:xfrm>
+      </p:grpSpPr>
+      <p:sp>
+        <p:nvSpPr>
+          <p:cNvPr id="8" name="Rectangle 7">
+            <a:extLst>
+              <a:ext uri="{FF2B5EF4-FFF2-40B4-BE49-F238E27FC236}">
+                <a16:creationId xmlns:a16="http://schemas.microsoft.com/office/drawing/2014/main" id="{F98ED85F-DCEE-4B50-802E-71A6E3E12B04}"/>
+              </a:ext>
+              <a:ext uri="{C183D7F6-B498-43B3-948B-1728B52AA6E4}">
+                <adec:decorative xmlns:adec="http://schemas.microsoft.com/office/drawing/2017/decorative" val="1"/>
+              </a:ext>
+            </a:extLst>
+          </p:cNvPr>
+          <p:cNvSpPr>
+            <a:spLocks noGrp="1" noRot="1" noChangeAspect="1" noMove="1" noResize="1" noEditPoints="1" noAdjustHandles="1" noChangeArrowheads="1" noChangeShapeType="1" noTextEdit="1"/>
+          </p:cNvSpPr>
+          <p:nvPr>
+            <p:extLst>
+              <p:ext uri="{386F3935-93C4-4BCD-93E2-E3B085C9AB24}">
+                <p16:designElem xmlns:p16="http://schemas.microsoft.com/office/powerpoint/2015/main" val="1"/>
+              </p:ext>
+            </p:extLst>
+          </p:nvPr>
+        </p:nvSpPr>
+        <p:spPr bwMode="ltGray">
+          <a:xfrm>
+            <a:off x="321564" y="320040"/>
+            <a:ext cx="11548872" cy="6217920"/>
+          </a:xfrm>
+          <a:prstGeom prst="rect">
+            <a:avLst/>
+          </a:prstGeom>
+          <a:solidFill>
+            <a:schemeClr val="tx1">
+              <a:alpha val="14000"/>
+            </a:schemeClr>
+          </a:solidFill>
+          <a:ln w="127000" cap="sq" cmpd="thinThick">
+            <a:solidFill>
+              <a:schemeClr val="tx1">
+                <a:lumMod val="85000"/>
+                <a:lumOff val="15000"/>
+                <a:alpha val="15000"/>
+              </a:schemeClr>
+            </a:solidFill>
+          </a:ln>
+        </p:spPr>
+        <p:style>
+          <a:lnRef idx="2">
+            <a:schemeClr val="accent1">
+              <a:shade val="50000"/>
+            </a:schemeClr>
+          </a:lnRef>
+          <a:fillRef idx="1">
+            <a:schemeClr val="accent1"/>
+          </a:fillRef>
+          <a:effectRef idx="0">
+            <a:schemeClr val="accent1"/>
+          </a:effectRef>
+          <a:fontRef idx="minor">
+            <a:schemeClr val="lt1"/>
+          </a:fontRef>
+        </p:style>
+        <p:txBody>
+          <a:bodyPr rtlCol="0" anchor="ctr"/>
+          <a:lstStyle/>
+          <a:p>
+            <a:pPr algn="ctr"/>
+            <a:endParaRPr lang="en-US"/>
+          </a:p>
+        </p:txBody>
+      </p:sp>
+      <p:sp>
+        <p:nvSpPr>
+          <p:cNvPr id="2" name="Title 1">
+            <a:extLst>
+              <a:ext uri="{FF2B5EF4-FFF2-40B4-BE49-F238E27FC236}">
+                <a16:creationId xmlns:a16="http://schemas.microsoft.com/office/drawing/2014/main" id="{FD941AC5-D366-4F3A-90F1-BEF2CC19D74C}"/>
+              </a:ext>
+            </a:extLst>
+          </p:cNvPr>
+          <p:cNvSpPr>
+            <a:spLocks noGrp="1"/>
+          </p:cNvSpPr>
+          <p:nvPr>
+            <p:ph type="title"/>
+          </p:nvPr>
+        </p:nvSpPr>
+        <p:spPr>
+          <a:xfrm>
+            <a:off x="838200" y="631825"/>
+            <a:ext cx="10515600" cy="1325563"/>
+          </a:xfrm>
+        </p:spPr>
+        <p:txBody>
+          <a:bodyPr>
+            <a:normAutofit/>
+          </a:bodyPr>
+          <a:lstStyle/>
+          <a:p>
+            <a:r>
+              <a:rPr lang="en-US" dirty="0"/>
+              <a:t>Hate Crime Datasets cont’d:</a:t>
+            </a:r>
+          </a:p>
+        </p:txBody>
+      </p:sp>
+      <p:sp>
+        <p:nvSpPr>
+          <p:cNvPr id="3" name="Content Placeholder 2">
+            <a:extLst>
+              <a:ext uri="{FF2B5EF4-FFF2-40B4-BE49-F238E27FC236}">
+                <a16:creationId xmlns:a16="http://schemas.microsoft.com/office/drawing/2014/main" id="{5D0E4B2D-E204-4850-A9BF-F49B44C74727}"/>
+              </a:ext>
+            </a:extLst>
+          </p:cNvPr>
+          <p:cNvSpPr>
+            <a:spLocks noGrp="1"/>
+          </p:cNvSpPr>
+          <p:nvPr>
+            <p:ph idx="1"/>
+          </p:nvPr>
+        </p:nvSpPr>
+        <p:spPr>
+          <a:xfrm>
+            <a:off x="838200" y="2057400"/>
+            <a:ext cx="10515600" cy="3871762"/>
+          </a:xfrm>
+        </p:spPr>
+        <p:txBody>
+          <a:bodyPr>
+            <a:normAutofit/>
+          </a:bodyPr>
+          <a:lstStyle/>
+          <a:p>
+            <a:pPr marL="0" indent="0">
+              <a:buNone/>
+            </a:pPr>
+            <a:endParaRPr lang="en-US" sz="1700" dirty="0"/>
+          </a:p>
+          <a:p>
+            <a:r>
+              <a:rPr lang="en-US" sz="2400" dirty="0"/>
+              <a:t>US Census: American Fact Finder Gini Index of Income Inequality</a:t>
+            </a:r>
+          </a:p>
+          <a:p>
+            <a:pPr lvl="1"/>
+            <a:r>
+              <a:rPr lang="en-US" sz="2000" dirty="0">
+                <a:hlinkClick r:id="rId2"/>
+              </a:rPr>
+              <a:t>https://factfinder.census.gov/faces/tableservices/jsf/pages/productview.xhtml?pid=ACS_10_1YR_B19083&amp;prodType=table</a:t>
+            </a:r>
+            <a:endParaRPr lang="en-US" sz="2800" dirty="0"/>
+          </a:p>
+          <a:p>
+            <a:pPr lvl="1"/>
+            <a:endParaRPr lang="en-US" sz="2000" dirty="0"/>
+          </a:p>
+          <a:p>
+            <a:r>
+              <a:rPr lang="en-US" sz="2400" dirty="0"/>
+              <a:t>MIT Election Data: Science Lab</a:t>
+            </a:r>
+          </a:p>
+          <a:p>
+            <a:pPr lvl="1"/>
+            <a:r>
+              <a:rPr lang="en-US" sz="2000" dirty="0">
+                <a:hlinkClick r:id="rId3"/>
+              </a:rPr>
+              <a:t>https://electionlab.mit.edu/</a:t>
+            </a:r>
+            <a:endParaRPr lang="en-US" sz="2000" dirty="0"/>
+          </a:p>
+          <a:p>
+            <a:pPr lvl="2"/>
+            <a:endParaRPr lang="en-US" sz="1600" dirty="0"/>
+          </a:p>
+          <a:p>
+            <a:r>
+              <a:rPr lang="en-US" sz="2400" dirty="0"/>
+              <a:t>Limitations: </a:t>
+            </a:r>
+          </a:p>
+          <a:p>
+            <a:pPr lvl="1"/>
+            <a:r>
+              <a:rPr lang="en-US" sz="2000" dirty="0"/>
+              <a:t>State level data is typically not as accurate, nor descriptive as city/local </a:t>
+            </a:r>
+            <a:r>
+              <a:rPr lang="en-US" sz="2000"/>
+              <a:t>data.</a:t>
+            </a:r>
+            <a:endParaRPr lang="en-US" sz="2000" dirty="0"/>
+          </a:p>
+        </p:txBody>
+      </p:sp>
+    </p:spTree>
+    <p:extLst>
+      <p:ext uri="{BB962C8B-B14F-4D97-AF65-F5344CB8AC3E}">
+        <p14:creationId xmlns:p14="http://schemas.microsoft.com/office/powerpoint/2010/main" val="2305445753"/>
+      </p:ext>
+    </p:extLst>
+  </p:cSld>
+  <p:clrMapOvr>
+    <a:masterClrMapping/>
+  </p:clrMapOvr>
+</p:sld>
+</file>
+
+<file path=ppt/slides/slide4.xml><?xml version="1.0" encoding="utf-8"?>
+<p:sld xmlns:a="http://schemas.openxmlformats.org/drawingml/2006/main" xmlns:r="http://schemas.openxmlformats.org/officeDocument/2006/relationships" xmlns:p="http://schemas.openxmlformats.org/presentationml/2006/main">
+  <p:cSld>
+    <p:bg>
+      <p:bgPr>
+        <a:solidFill>
+          <a:schemeClr val="bg1"/>
+        </a:solidFill>
+        <a:effectLst/>
+      </p:bgPr>
+    </p:bg>
+    <p:spTree>
+      <p:nvGrpSpPr>
+        <p:cNvPr id="1" name=""/>
+        <p:cNvGrpSpPr/>
+        <p:nvPr/>
+      </p:nvGrpSpPr>
+      <p:grpSpPr>
+        <a:xfrm>
+          <a:off x="0" y="0"/>
+          <a:ext cx="0" cy="0"/>
+          <a:chOff x="0" y="0"/>
+          <a:chExt cx="0" cy="0"/>
+        </a:xfrm>
+      </p:grpSpPr>
+      <p:sp>
+        <p:nvSpPr>
+          <p:cNvPr id="10" name="Rectangle 9">
+            <a:extLst>
+              <a:ext uri="{FF2B5EF4-FFF2-40B4-BE49-F238E27FC236}">
+                <a16:creationId xmlns:a16="http://schemas.microsoft.com/office/drawing/2014/main" id="{F98ED85F-DCEE-4B50-802E-71A6E3E12B04}"/>
+              </a:ext>
+              <a:ext uri="{C183D7F6-B498-43B3-948B-1728B52AA6E4}">
+                <adec:decorative xmlns:adec="http://schemas.microsoft.com/office/drawing/2017/decorative" val="1"/>
+              </a:ext>
+            </a:extLst>
+          </p:cNvPr>
+          <p:cNvSpPr>
+            <a:spLocks noGrp="1" noRot="1" noChangeAspect="1" noMove="1" noResize="1" noEditPoints="1" noAdjustHandles="1" noChangeArrowheads="1" noChangeShapeType="1" noTextEdit="1"/>
+          </p:cNvSpPr>
+          <p:nvPr>
+            <p:extLst>
+              <p:ext uri="{386F3935-93C4-4BCD-93E2-E3B085C9AB24}">
+                <p16:designElem xmlns:p16="http://schemas.microsoft.com/office/powerpoint/2015/main" val="1"/>
+              </p:ext>
+            </p:extLst>
+          </p:nvPr>
+        </p:nvSpPr>
+        <p:spPr bwMode="ltGray">
+          <a:xfrm>
+            <a:off x="321564" y="320040"/>
+            <a:ext cx="11548872" cy="6217920"/>
+          </a:xfrm>
+          <a:prstGeom prst="rect">
+            <a:avLst/>
+          </a:prstGeom>
+          <a:solidFill>
+            <a:schemeClr val="tx1">
+              <a:alpha val="14000"/>
+            </a:schemeClr>
+          </a:solidFill>
+          <a:ln w="127000" cap="sq" cmpd="thinThick">
+            <a:solidFill>
+              <a:schemeClr val="tx1">
+                <a:lumMod val="85000"/>
+                <a:lumOff val="15000"/>
+                <a:alpha val="15000"/>
+              </a:schemeClr>
+            </a:solidFill>
+          </a:ln>
+        </p:spPr>
+        <p:style>
+          <a:lnRef idx="2">
+            <a:schemeClr val="accent1">
+              <a:shade val="50000"/>
+            </a:schemeClr>
+          </a:lnRef>
+          <a:fillRef idx="1">
+            <a:schemeClr val="accent1"/>
+          </a:fillRef>
+          <a:effectRef idx="0">
+            <a:schemeClr val="accent1"/>
+          </a:effectRef>
+          <a:fontRef idx="minor">
+            <a:schemeClr val="lt1"/>
+          </a:fontRef>
+        </p:style>
+        <p:txBody>
+          <a:bodyPr rtlCol="0" anchor="ctr"/>
+          <a:lstStyle/>
+          <a:p>
+            <a:pPr algn="ctr"/>
+            <a:endParaRPr lang="en-US"/>
+          </a:p>
+        </p:txBody>
+      </p:sp>
+      <p:sp>
+        <p:nvSpPr>
+          <p:cNvPr id="4" name="Title 3">
+            <a:extLst>
+              <a:ext uri="{FF2B5EF4-FFF2-40B4-BE49-F238E27FC236}">
+                <a16:creationId xmlns:a16="http://schemas.microsoft.com/office/drawing/2014/main" id="{8E25E34F-668C-4540-8F90-C2B5B5CC65D5}"/>
+              </a:ext>
+            </a:extLst>
+          </p:cNvPr>
+          <p:cNvSpPr>
+            <a:spLocks noGrp="1"/>
+          </p:cNvSpPr>
+          <p:nvPr>
+            <p:ph type="title"/>
+          </p:nvPr>
+        </p:nvSpPr>
+        <p:spPr>
+          <a:xfrm>
+            <a:off x="838200" y="631825"/>
+            <a:ext cx="10515600" cy="1325563"/>
+          </a:xfrm>
+        </p:spPr>
+        <p:txBody>
+          <a:bodyPr>
+            <a:normAutofit/>
+          </a:bodyPr>
+          <a:lstStyle/>
+          <a:p>
+            <a:r>
+              <a:rPr lang="en-US" dirty="0"/>
+              <a:t>Describe basic stats</a:t>
+            </a:r>
+          </a:p>
+        </p:txBody>
+      </p:sp>
+      <p:sp>
+        <p:nvSpPr>
+          <p:cNvPr id="5" name="Content Placeholder 4">
+            <a:extLst>
+              <a:ext uri="{FF2B5EF4-FFF2-40B4-BE49-F238E27FC236}">
+                <a16:creationId xmlns:a16="http://schemas.microsoft.com/office/drawing/2014/main" id="{FD830E9C-8A59-4ECC-B2C0-C421E52B768B}"/>
+              </a:ext>
+            </a:extLst>
+          </p:cNvPr>
+          <p:cNvSpPr>
+            <a:spLocks noGrp="1"/>
+          </p:cNvSpPr>
+          <p:nvPr>
+            <p:ph idx="1"/>
+          </p:nvPr>
+        </p:nvSpPr>
+        <p:spPr>
+          <a:xfrm>
+            <a:off x="838200" y="2057400"/>
+            <a:ext cx="10515600" cy="3871762"/>
+          </a:xfrm>
+        </p:spPr>
+        <p:txBody>
+          <a:bodyPr>
+            <a:normAutofit/>
+          </a:bodyPr>
+          <a:lstStyle/>
+          <a:p>
+            <a:endParaRPr lang="en-US" sz="2400"/>
+          </a:p>
+        </p:txBody>
+      </p:sp>
+    </p:spTree>
+    <p:extLst>
+      <p:ext uri="{BB962C8B-B14F-4D97-AF65-F5344CB8AC3E}">
+        <p14:creationId xmlns:p14="http://schemas.microsoft.com/office/powerpoint/2010/main" val="3966133736"/>
+      </p:ext>
+    </p:extLst>
+  </p:cSld>
+  <p:clrMapOvr>
+    <a:masterClrMapping/>
+  </p:clrMapOvr>
+</p:sld>
+</file>
+
+<file path=ppt/slides/slide5.xml><?xml version="1.0" encoding="utf-8"?>
+<p:sld xmlns:a="http://schemas.openxmlformats.org/drawingml/2006/main" xmlns:r="http://schemas.openxmlformats.org/officeDocument/2006/relationships" xmlns:p="http://schemas.openxmlformats.org/presentationml/2006/main">
+  <p:cSld>
+    <p:bg>
+      <p:bgPr>
+        <a:solidFill>
+          <a:schemeClr val="bg1"/>
+        </a:solidFill>
+        <a:effectLst/>
+      </p:bgPr>
+    </p:bg>
+    <p:spTree>
+      <p:nvGrpSpPr>
+        <p:cNvPr id="1" name=""/>
+        <p:cNvGrpSpPr/>
+        <p:nvPr/>
+      </p:nvGrpSpPr>
+      <p:grpSpPr>
+        <a:xfrm>
+          <a:off x="0" y="0"/>
+          <a:ext cx="0" cy="0"/>
+          <a:chOff x="0" y="0"/>
+          <a:chExt cx="0" cy="0"/>
+        </a:xfrm>
+      </p:grpSpPr>
+      <p:sp>
+        <p:nvSpPr>
+          <p:cNvPr id="30" name="Rectangle 7">
+            <a:extLst>
+              <a:ext uri="{FF2B5EF4-FFF2-40B4-BE49-F238E27FC236}">
+                <a16:creationId xmlns:a16="http://schemas.microsoft.com/office/drawing/2014/main" id="{D8386171-E87D-46AB-8718-4CE2A88748BD}"/>
+              </a:ext>
+              <a:ext uri="{C183D7F6-B498-43B3-948B-1728B52AA6E4}">
+                <adec:decorative xmlns:adec="http://schemas.microsoft.com/office/drawing/2017/decorative" val="1"/>
+              </a:ext>
+            </a:extLst>
+          </p:cNvPr>
+          <p:cNvSpPr>
+            <a:spLocks noGrp="1" noRot="1" noChangeAspect="1" noMove="1" noResize="1" noEditPoints="1" noAdjustHandles="1" noChangeArrowheads="1" noChangeShapeType="1" noTextEdit="1"/>
+          </p:cNvSpPr>
+          <p:nvPr>
+            <p:extLst>
+              <p:ext uri="{386F3935-93C4-4BCD-93E2-E3B085C9AB24}">
+                <p16:designElem xmlns:p16="http://schemas.microsoft.com/office/powerpoint/2015/main" val="1"/>
+              </p:ext>
+            </p:extLst>
+          </p:nvPr>
+        </p:nvSpPr>
+        <p:spPr>
+          <a:xfrm>
+            <a:off x="0" y="0"/>
+            <a:ext cx="12192000" cy="6858000"/>
+          </a:xfrm>
+          <a:prstGeom prst="rect">
+            <a:avLst/>
+          </a:prstGeom>
+          <a:solidFill>
+            <a:srgbClr val="C8CACA"/>
+          </a:solidFill>
+          <a:ln>
+            <a:noFill/>
+          </a:ln>
+        </p:spPr>
+        <p:style>
+          <a:lnRef idx="2">
+            <a:schemeClr val="accent1">
+              <a:shade val="50000"/>
+            </a:schemeClr>
+          </a:lnRef>
+          <a:fillRef idx="1">
+            <a:schemeClr val="accent1"/>
+          </a:fillRef>
+          <a:effectRef idx="0">
+            <a:schemeClr val="accent1"/>
+          </a:effectRef>
+          <a:fontRef idx="minor">
+            <a:schemeClr val="lt1"/>
+          </a:fontRef>
+        </p:style>
+        <p:txBody>
+          <a:bodyPr rtlCol="0" anchor="ctr"/>
+          <a:lstStyle/>
+          <a:p>
+            <a:pPr algn="ctr"/>
+            <a:endParaRPr lang="en-US"/>
+          </a:p>
+        </p:txBody>
+      </p:sp>
+      <p:sp>
+        <p:nvSpPr>
+          <p:cNvPr id="31" name="Rounded Rectangle 26">
+            <a:extLst>
+              <a:ext uri="{FF2B5EF4-FFF2-40B4-BE49-F238E27FC236}">
+                <a16:creationId xmlns:a16="http://schemas.microsoft.com/office/drawing/2014/main" id="{207CB456-8849-413C-8210-B663779A32E0}"/>
+              </a:ext>
+              <a:ext uri="{C183D7F6-B498-43B3-948B-1728B52AA6E4}">
+                <adec:decorative xmlns:adec="http://schemas.microsoft.com/office/drawing/2017/decorative" val="1"/>
+              </a:ext>
+            </a:extLst>
+          </p:cNvPr>
+          <p:cNvSpPr>
+            <a:spLocks noGrp="1" noRot="1" noChangeAspect="1" noMove="1" noResize="1" noEditPoints="1" noAdjustHandles="1" noChangeArrowheads="1" noChangeShapeType="1" noTextEdit="1"/>
+          </p:cNvSpPr>
+          <p:nvPr>
+            <p:extLst>
+              <p:ext uri="{386F3935-93C4-4BCD-93E2-E3B085C9AB24}">
+                <p16:designElem xmlns:p16="http://schemas.microsoft.com/office/powerpoint/2015/main" val="1"/>
+              </p:ext>
+            </p:extLst>
+          </p:nvPr>
+        </p:nvSpPr>
+        <p:spPr>
+          <a:xfrm>
+            <a:off x="646745" y="640080"/>
+            <a:ext cx="10920415" cy="5577818"/>
+          </a:xfrm>
+          <a:prstGeom prst="roundRect">
+            <a:avLst>
+              <a:gd name="adj" fmla="val 0"/>
+            </a:avLst>
+          </a:prstGeom>
+          <a:solidFill>
+            <a:srgbClr val="FFFFFF"/>
+          </a:solidFill>
+          <a:ln w="9525">
+            <a:solidFill>
+              <a:srgbClr val="C8CACA"/>
+            </a:solidFill>
+          </a:ln>
+          <a:effectLst>
+            <a:outerShdw blurRad="57150" dist="19050" dir="5400000" algn="t" rotWithShape="0">
+              <a:prstClr val="black">
+                <a:alpha val="63000"/>
+              </a:prstClr>
+            </a:outerShdw>
+          </a:effectLst>
+        </p:spPr>
+        <p:style>
+          <a:lnRef idx="2">
+            <a:schemeClr val="accent1">
+              <a:shade val="50000"/>
+            </a:schemeClr>
+          </a:lnRef>
+          <a:fillRef idx="1">
+            <a:schemeClr val="accent1"/>
+          </a:fillRef>
+          <a:effectRef idx="0">
+            <a:schemeClr val="accent1"/>
+          </a:effectRef>
+          <a:fontRef idx="minor">
+            <a:schemeClr val="lt1"/>
+          </a:fontRef>
+        </p:style>
+        <p:txBody>
+          <a:bodyPr rtlCol="0" anchor="ctr"/>
+          <a:lstStyle/>
+          <a:p>
+            <a:pPr algn="ctr"/>
+            <a:endParaRPr lang="en-US"/>
+          </a:p>
+        </p:txBody>
+      </p:sp>
+      <p:sp>
+        <p:nvSpPr>
+          <p:cNvPr id="32" name="Rectangle 11">
+            <a:extLst>
+              <a:ext uri="{FF2B5EF4-FFF2-40B4-BE49-F238E27FC236}">
+                <a16:creationId xmlns:a16="http://schemas.microsoft.com/office/drawing/2014/main" id="{E513936D-D1EB-4E42-A97F-942BA1F3DFA7}"/>
+              </a:ext>
+              <a:ext uri="{C183D7F6-B498-43B3-948B-1728B52AA6E4}">
+                <adec:decorative xmlns:adec="http://schemas.microsoft.com/office/drawing/2017/decorative" val="1"/>
+              </a:ext>
+            </a:extLst>
+          </p:cNvPr>
+          <p:cNvSpPr>
+            <a:spLocks noGrp="1" noRot="1" noChangeAspect="1" noMove="1" noResize="1" noEditPoints="1" noAdjustHandles="1" noChangeArrowheads="1" noChangeShapeType="1" noTextEdit="1"/>
+          </p:cNvSpPr>
+          <p:nvPr>
+            <p:extLst>
+              <p:ext uri="{386F3935-93C4-4BCD-93E2-E3B085C9AB24}">
+                <p16:designElem xmlns:p16="http://schemas.microsoft.com/office/powerpoint/2015/main" val="1"/>
+              </p:ext>
+            </p:extLst>
+          </p:nvPr>
+        </p:nvSpPr>
+        <p:spPr>
+          <a:xfrm>
+            <a:off x="968024" y="960109"/>
+            <a:ext cx="10277856" cy="4937760"/>
+          </a:xfrm>
+          <a:prstGeom prst="rect">
+            <a:avLst/>
+          </a:prstGeom>
+          <a:solidFill>
+            <a:schemeClr val="bg2"/>
+          </a:solidFill>
+          <a:ln>
+            <a:noFill/>
+          </a:ln>
+        </p:spPr>
+        <p:style>
+          <a:lnRef idx="2">
+            <a:schemeClr val="accent1">
+              <a:shade val="50000"/>
+            </a:schemeClr>
+          </a:lnRef>
+          <a:fillRef idx="1">
+            <a:schemeClr val="accent1"/>
+          </a:fillRef>
+          <a:effectRef idx="0">
+            <a:schemeClr val="accent1"/>
+          </a:effectRef>
+          <a:fontRef idx="minor">
+            <a:schemeClr val="lt1"/>
+          </a:fontRef>
+        </p:style>
+        <p:txBody>
+          <a:bodyPr rtlCol="0" anchor="ctr"/>
+          <a:lstStyle/>
+          <a:p>
+            <a:pPr algn="ctr"/>
+            <a:endParaRPr lang="en-US"/>
+          </a:p>
+        </p:txBody>
+      </p:sp>
+      <p:sp>
+        <p:nvSpPr>
+          <p:cNvPr id="2" name="Title 1">
+            <a:extLst>
+              <a:ext uri="{FF2B5EF4-FFF2-40B4-BE49-F238E27FC236}">
+                <a16:creationId xmlns:a16="http://schemas.microsoft.com/office/drawing/2014/main" id="{28750D29-79F8-4FE9-BE40-B7BAE2B1F7B9}"/>
+              </a:ext>
+            </a:extLst>
+          </p:cNvPr>
+          <p:cNvSpPr>
+            <a:spLocks noGrp="1"/>
+          </p:cNvSpPr>
+          <p:nvPr>
+            <p:ph type="title"/>
+          </p:nvPr>
+        </p:nvSpPr>
+        <p:spPr>
+          <a:xfrm>
+            <a:off x="1524000" y="1376362"/>
+            <a:ext cx="9144000" cy="2603274"/>
+          </a:xfrm>
+        </p:spPr>
+        <p:txBody>
+          <a:bodyPr vert="horz" lIns="91440" tIns="45720" rIns="91440" bIns="45720" rtlCol="0" anchor="b">
+            <a:normAutofit/>
+          </a:bodyPr>
+          <a:lstStyle/>
+          <a:p>
+            <a:pPr algn="ctr"/>
+            <a:r>
+              <a:rPr lang="en-US" sz="5400" kern="1200">
+                <a:solidFill>
+                  <a:schemeClr val="tx1"/>
+                </a:solidFill>
+                <a:latin typeface="+mj-lt"/>
+                <a:ea typeface="+mj-ea"/>
+                <a:cs typeface="+mj-cs"/>
+              </a:rPr>
+              <a:t>Socioeconomic Analysis:</a:t>
+            </a:r>
+          </a:p>
+        </p:txBody>
+      </p:sp>
+      <p:sp>
+        <p:nvSpPr>
+          <p:cNvPr id="3" name="Text Placeholder 2">
+            <a:extLst>
+              <a:ext uri="{FF2B5EF4-FFF2-40B4-BE49-F238E27FC236}">
+                <a16:creationId xmlns:a16="http://schemas.microsoft.com/office/drawing/2014/main" id="{FC6A2D2E-209A-47B0-A00D-E3A7C76B1FF6}"/>
+              </a:ext>
+            </a:extLst>
+          </p:cNvPr>
+          <p:cNvSpPr>
+            <a:spLocks noGrp="1"/>
+          </p:cNvSpPr>
+          <p:nvPr>
+            <p:ph type="body" idx="1"/>
+          </p:nvPr>
+        </p:nvSpPr>
+        <p:spPr>
+          <a:xfrm>
+            <a:off x="1524000" y="4118088"/>
+            <a:ext cx="9144000" cy="1393711"/>
+          </a:xfrm>
+        </p:spPr>
+        <p:txBody>
+          <a:bodyPr vert="horz" lIns="91440" tIns="45720" rIns="91440" bIns="45720" rtlCol="0">
+            <a:normAutofit/>
+          </a:bodyPr>
+          <a:lstStyle/>
+          <a:p>
+            <a:r>
+              <a:rPr lang="en-US" sz="2400" kern="1200" dirty="0">
+                <a:solidFill>
+                  <a:schemeClr val="tx1"/>
+                </a:solidFill>
+                <a:latin typeface="+mn-lt"/>
+                <a:ea typeface="+mn-ea"/>
+                <a:cs typeface="+mn-cs"/>
+              </a:rPr>
+              <a:t>Hypothesis: </a:t>
+            </a:r>
+          </a:p>
+        </p:txBody>
+      </p:sp>
+    </p:spTree>
+    <p:extLst>
+      <p:ext uri="{BB962C8B-B14F-4D97-AF65-F5344CB8AC3E}">
+        <p14:creationId xmlns:p14="http://schemas.microsoft.com/office/powerpoint/2010/main" val="3593529453"/>
       </p:ext>
     </p:extLst>
   </p:cSld>

</xml_diff>